<commit_message>
Update ABriefSlideshow.pptx github reference
</commit_message>
<xml_diff>
--- a/ABriefSlideshow.pptx
+++ b/ABriefSlideshow.pptx
@@ -198,7 +198,7 @@
           <a:p>
             <a:fld id="{0426DCCC-E4DE-8F4D-A7C7-582CA9F01594}" type="datetimeFigureOut">
               <a:rPr lang="en-US" smtClean="0"/>
-              <a:t>2/19/25</a:t>
+              <a:t>1/7/26</a:t>
             </a:fld>
             <a:endParaRPr lang="en-US"/>
           </a:p>
@@ -1454,7 +1454,7 @@
           <a:p>
             <a:fld id="{E762D253-5843-3947-8602-0EE1BEFA5C67}" type="datetimeFigureOut">
               <a:rPr lang="en-US" smtClean="0"/>
-              <a:t>2/19/25</a:t>
+              <a:t>1/7/26</a:t>
             </a:fld>
             <a:endParaRPr lang="en-US"/>
           </a:p>
@@ -1652,7 +1652,7 @@
           <a:p>
             <a:fld id="{E762D253-5843-3947-8602-0EE1BEFA5C67}" type="datetimeFigureOut">
               <a:rPr lang="en-US" smtClean="0"/>
-              <a:t>2/19/25</a:t>
+              <a:t>1/7/26</a:t>
             </a:fld>
             <a:endParaRPr lang="en-US"/>
           </a:p>
@@ -1860,7 +1860,7 @@
           <a:p>
             <a:fld id="{E762D253-5843-3947-8602-0EE1BEFA5C67}" type="datetimeFigureOut">
               <a:rPr lang="en-US" smtClean="0"/>
-              <a:t>2/19/25</a:t>
+              <a:t>1/7/26</a:t>
             </a:fld>
             <a:endParaRPr lang="en-US"/>
           </a:p>
@@ -2058,7 +2058,7 @@
           <a:p>
             <a:fld id="{E762D253-5843-3947-8602-0EE1BEFA5C67}" type="datetimeFigureOut">
               <a:rPr lang="en-US" smtClean="0"/>
-              <a:t>2/19/25</a:t>
+              <a:t>1/7/26</a:t>
             </a:fld>
             <a:endParaRPr lang="en-US"/>
           </a:p>
@@ -2333,7 +2333,7 @@
           <a:p>
             <a:fld id="{E762D253-5843-3947-8602-0EE1BEFA5C67}" type="datetimeFigureOut">
               <a:rPr lang="en-US" smtClean="0"/>
-              <a:t>2/19/25</a:t>
+              <a:t>1/7/26</a:t>
             </a:fld>
             <a:endParaRPr lang="en-US"/>
           </a:p>
@@ -2598,7 +2598,7 @@
           <a:p>
             <a:fld id="{E762D253-5843-3947-8602-0EE1BEFA5C67}" type="datetimeFigureOut">
               <a:rPr lang="en-US" smtClean="0"/>
-              <a:t>2/19/25</a:t>
+              <a:t>1/7/26</a:t>
             </a:fld>
             <a:endParaRPr lang="en-US"/>
           </a:p>
@@ -3010,7 +3010,7 @@
           <a:p>
             <a:fld id="{E762D253-5843-3947-8602-0EE1BEFA5C67}" type="datetimeFigureOut">
               <a:rPr lang="en-US" smtClean="0"/>
-              <a:t>2/19/25</a:t>
+              <a:t>1/7/26</a:t>
             </a:fld>
             <a:endParaRPr lang="en-US"/>
           </a:p>
@@ -3151,7 +3151,7 @@
           <a:p>
             <a:fld id="{E762D253-5843-3947-8602-0EE1BEFA5C67}" type="datetimeFigureOut">
               <a:rPr lang="en-US" smtClean="0"/>
-              <a:t>2/19/25</a:t>
+              <a:t>1/7/26</a:t>
             </a:fld>
             <a:endParaRPr lang="en-US"/>
           </a:p>
@@ -3264,7 +3264,7 @@
           <a:p>
             <a:fld id="{E762D253-5843-3947-8602-0EE1BEFA5C67}" type="datetimeFigureOut">
               <a:rPr lang="en-US" smtClean="0"/>
-              <a:t>2/19/25</a:t>
+              <a:t>1/7/26</a:t>
             </a:fld>
             <a:endParaRPr lang="en-US"/>
           </a:p>
@@ -3575,7 +3575,7 @@
           <a:p>
             <a:fld id="{E762D253-5843-3947-8602-0EE1BEFA5C67}" type="datetimeFigureOut">
               <a:rPr lang="en-US" smtClean="0"/>
-              <a:t>2/19/25</a:t>
+              <a:t>1/7/26</a:t>
             </a:fld>
             <a:endParaRPr lang="en-US"/>
           </a:p>
@@ -3863,7 +3863,7 @@
           <a:p>
             <a:fld id="{E762D253-5843-3947-8602-0EE1BEFA5C67}" type="datetimeFigureOut">
               <a:rPr lang="en-US" smtClean="0"/>
-              <a:t>2/19/25</a:t>
+              <a:t>1/7/26</a:t>
             </a:fld>
             <a:endParaRPr lang="en-US"/>
           </a:p>
@@ -4104,7 +4104,7 @@
           <a:p>
             <a:fld id="{E762D253-5843-3947-8602-0EE1BEFA5C67}" type="datetimeFigureOut">
               <a:rPr lang="en-US" smtClean="0"/>
-              <a:t>2/19/25</a:t>
+              <a:t>1/7/26</a:t>
             </a:fld>
             <a:endParaRPr lang="en-US"/>
           </a:p>
@@ -4603,13 +4603,8 @@
             </a:r>
             <a:r>
               <a:rPr lang="en-US" sz="1800" dirty="0"/>
-              <a:t>/</a:t>
-            </a:r>
-            <a:r>
-              <a:rPr lang="en-US" sz="1800" dirty="0" err="1"/>
-              <a:t>abriefhistoryofai</a:t>
-            </a:r>
-            <a:endParaRPr lang="en-US" sz="1800" dirty="0"/>
+              <a:t>/a-brief-history-of-ai</a:t>
+            </a:r>
           </a:p>
         </p:txBody>
       </p:sp>
@@ -5611,30 +5606,25 @@
           <a:p>
             <a:pPr algn="ctr"/>
             <a:r>
-              <a:rPr lang="en-US" sz="1800" dirty="0"/>
+              <a:rPr lang="en-US" dirty="0"/>
               <a:t>https://</a:t>
             </a:r>
             <a:r>
-              <a:rPr lang="en-US" sz="1800" dirty="0" err="1"/>
+              <a:rPr lang="en-US" dirty="0" err="1"/>
               <a:t>github.com</a:t>
             </a:r>
             <a:r>
-              <a:rPr lang="en-US" sz="1800" dirty="0"/>
+              <a:rPr lang="en-US" dirty="0"/>
               <a:t>/</a:t>
             </a:r>
             <a:r>
-              <a:rPr lang="en-US" sz="1800" b="1" dirty="0" err="1"/>
+              <a:rPr lang="en-US" b="1" dirty="0" err="1"/>
               <a:t>crankingai</a:t>
             </a:r>
             <a:r>
-              <a:rPr lang="en-US" sz="1800" dirty="0"/>
-              <a:t>/</a:t>
-            </a:r>
-            <a:r>
-              <a:rPr lang="en-US" sz="1800" dirty="0" err="1"/>
-              <a:t>abriefhistoryofai</a:t>
-            </a:r>
-            <a:endParaRPr lang="en-US" sz="1800" dirty="0"/>
+              <a:rPr lang="en-US" dirty="0"/>
+              <a:t>/a-brief-history-of-ai</a:t>
+            </a:r>
           </a:p>
         </p:txBody>
       </p:sp>

</xml_diff>